<commit_message>
More tweaks to sift.py, experimenting with feature detection.
</commit_message>
<xml_diff>
--- a/Sign.pptx
+++ b/Sign.pptx
@@ -104,6 +104,11 @@
       </a:defRPr>
     </a:lvl9pPr>
   </p:defaultTextStyle>
+  <p:extLst>
+    <p:ext uri="{EFAFB233-063F-42B5-8137-9DF3F51BA10A}">
+      <p15:sldGuideLst xmlns:p15="http://schemas.microsoft.com/office/powerpoint/2012/main"/>
+    </p:ext>
+  </p:extLst>
 </p:presentation>
 </file>
 
@@ -238,7 +243,7 @@
           <a:p>
             <a:fld id="{AF6AB20E-A2B2-9E46-BD10-169AD594FF45}" type="datetimeFigureOut">
               <a:rPr lang="en-US" smtClean="0"/>
-              <a:t>3/2/20</a:t>
+              <a:t>3/6/20</a:t>
             </a:fld>
             <a:endParaRPr lang="en-US"/>
           </a:p>
@@ -403,7 +408,7 @@
           <a:p>
             <a:fld id="{AF6AB20E-A2B2-9E46-BD10-169AD594FF45}" type="datetimeFigureOut">
               <a:rPr lang="en-US" smtClean="0"/>
-              <a:t>3/2/20</a:t>
+              <a:t>3/6/20</a:t>
             </a:fld>
             <a:endParaRPr lang="en-US"/>
           </a:p>
@@ -578,7 +583,7 @@
           <a:p>
             <a:fld id="{AF6AB20E-A2B2-9E46-BD10-169AD594FF45}" type="datetimeFigureOut">
               <a:rPr lang="en-US" smtClean="0"/>
-              <a:t>3/2/20</a:t>
+              <a:t>3/6/20</a:t>
             </a:fld>
             <a:endParaRPr lang="en-US"/>
           </a:p>
@@ -743,7 +748,7 @@
           <a:p>
             <a:fld id="{AF6AB20E-A2B2-9E46-BD10-169AD594FF45}" type="datetimeFigureOut">
               <a:rPr lang="en-US" smtClean="0"/>
-              <a:t>3/2/20</a:t>
+              <a:t>3/6/20</a:t>
             </a:fld>
             <a:endParaRPr lang="en-US"/>
           </a:p>
@@ -982,7 +987,7 @@
           <a:p>
             <a:fld id="{AF6AB20E-A2B2-9E46-BD10-169AD594FF45}" type="datetimeFigureOut">
               <a:rPr lang="en-US" smtClean="0"/>
-              <a:t>3/2/20</a:t>
+              <a:t>3/6/20</a:t>
             </a:fld>
             <a:endParaRPr lang="en-US"/>
           </a:p>
@@ -1209,7 +1214,7 @@
           <a:p>
             <a:fld id="{AF6AB20E-A2B2-9E46-BD10-169AD594FF45}" type="datetimeFigureOut">
               <a:rPr lang="en-US" smtClean="0"/>
-              <a:t>3/2/20</a:t>
+              <a:t>3/6/20</a:t>
             </a:fld>
             <a:endParaRPr lang="en-US"/>
           </a:p>
@@ -1571,7 +1576,7 @@
           <a:p>
             <a:fld id="{AF6AB20E-A2B2-9E46-BD10-169AD594FF45}" type="datetimeFigureOut">
               <a:rPr lang="en-US" smtClean="0"/>
-              <a:t>3/2/20</a:t>
+              <a:t>3/6/20</a:t>
             </a:fld>
             <a:endParaRPr lang="en-US"/>
           </a:p>
@@ -1684,7 +1689,7 @@
           <a:p>
             <a:fld id="{AF6AB20E-A2B2-9E46-BD10-169AD594FF45}" type="datetimeFigureOut">
               <a:rPr lang="en-US" smtClean="0"/>
-              <a:t>3/2/20</a:t>
+              <a:t>3/6/20</a:t>
             </a:fld>
             <a:endParaRPr lang="en-US"/>
           </a:p>
@@ -1774,7 +1779,7 @@
           <a:p>
             <a:fld id="{AF6AB20E-A2B2-9E46-BD10-169AD594FF45}" type="datetimeFigureOut">
               <a:rPr lang="en-US" smtClean="0"/>
-              <a:t>3/2/20</a:t>
+              <a:t>3/6/20</a:t>
             </a:fld>
             <a:endParaRPr lang="en-US"/>
           </a:p>
@@ -2046,7 +2051,7 @@
           <a:p>
             <a:fld id="{AF6AB20E-A2B2-9E46-BD10-169AD594FF45}" type="datetimeFigureOut">
               <a:rPr lang="en-US" smtClean="0"/>
-              <a:t>3/2/20</a:t>
+              <a:t>3/6/20</a:t>
             </a:fld>
             <a:endParaRPr lang="en-US"/>
           </a:p>
@@ -2298,7 +2303,7 @@
           <a:p>
             <a:fld id="{AF6AB20E-A2B2-9E46-BD10-169AD594FF45}" type="datetimeFigureOut">
               <a:rPr lang="en-US" smtClean="0"/>
-              <a:t>3/2/20</a:t>
+              <a:t>3/6/20</a:t>
             </a:fld>
             <a:endParaRPr lang="en-US"/>
           </a:p>
@@ -2506,7 +2511,7 @@
           <a:p>
             <a:fld id="{AF6AB20E-A2B2-9E46-BD10-169AD594FF45}" type="datetimeFigureOut">
               <a:rPr lang="en-US" smtClean="0"/>
-              <a:t>3/2/20</a:t>
+              <a:t>3/6/20</a:t>
             </a:fld>
             <a:endParaRPr lang="en-US"/>
           </a:p>
@@ -3008,6 +3013,374 @@
           </a:p>
         </p:txBody>
       </p:sp>
+      <p:sp>
+        <p:nvSpPr>
+          <p:cNvPr id="2" name="Rectangle 1"/>
+          <p:cNvSpPr/>
+          <p:nvPr/>
+        </p:nvSpPr>
+        <p:spPr>
+          <a:xfrm>
+            <a:off x="1745673" y="1346661"/>
+            <a:ext cx="1379912" cy="1197033"/>
+          </a:xfrm>
+          <a:prstGeom prst="rect">
+            <a:avLst/>
+          </a:prstGeom>
+          <a:noFill/>
+          <a:ln w="76200">
+            <a:solidFill>
+              <a:schemeClr val="tx1"/>
+            </a:solidFill>
+          </a:ln>
+        </p:spPr>
+        <p:style>
+          <a:lnRef idx="2">
+            <a:schemeClr val="accent1">
+              <a:shade val="50000"/>
+            </a:schemeClr>
+          </a:lnRef>
+          <a:fillRef idx="1">
+            <a:schemeClr val="accent1"/>
+          </a:fillRef>
+          <a:effectRef idx="0">
+            <a:schemeClr val="accent1"/>
+          </a:effectRef>
+          <a:fontRef idx="minor">
+            <a:schemeClr val="lt1"/>
+          </a:fontRef>
+        </p:style>
+        <p:txBody>
+          <a:bodyPr rtlCol="0" anchor="ctr"/>
+          <a:lstStyle/>
+          <a:p>
+            <a:pPr algn="ctr"/>
+            <a:endParaRPr lang="en-US"/>
+          </a:p>
+        </p:txBody>
+      </p:sp>
+      <p:sp>
+        <p:nvSpPr>
+          <p:cNvPr id="6" name="Rectangle 5"/>
+          <p:cNvSpPr/>
+          <p:nvPr/>
+        </p:nvSpPr>
+        <p:spPr>
+          <a:xfrm>
+            <a:off x="2121131" y="2856121"/>
+            <a:ext cx="628996" cy="901232"/>
+          </a:xfrm>
+          <a:prstGeom prst="rect">
+            <a:avLst/>
+          </a:prstGeom>
+          <a:noFill/>
+          <a:ln w="76200">
+            <a:solidFill>
+              <a:schemeClr val="tx1"/>
+            </a:solidFill>
+          </a:ln>
+        </p:spPr>
+        <p:style>
+          <a:lnRef idx="2">
+            <a:schemeClr val="accent1">
+              <a:shade val="50000"/>
+            </a:schemeClr>
+          </a:lnRef>
+          <a:fillRef idx="1">
+            <a:schemeClr val="accent1"/>
+          </a:fillRef>
+          <a:effectRef idx="0">
+            <a:schemeClr val="accent1"/>
+          </a:effectRef>
+          <a:fontRef idx="minor">
+            <a:schemeClr val="lt1"/>
+          </a:fontRef>
+        </p:style>
+        <p:txBody>
+          <a:bodyPr rtlCol="0" anchor="ctr"/>
+          <a:lstStyle/>
+          <a:p>
+            <a:pPr algn="ctr"/>
+            <a:endParaRPr lang="en-US"/>
+          </a:p>
+        </p:txBody>
+      </p:sp>
+      <p:sp>
+        <p:nvSpPr>
+          <p:cNvPr id="7" name="Rectangle 6"/>
+          <p:cNvSpPr/>
+          <p:nvPr/>
+        </p:nvSpPr>
+        <p:spPr>
+          <a:xfrm>
+            <a:off x="2121131" y="4169149"/>
+            <a:ext cx="628996" cy="569106"/>
+          </a:xfrm>
+          <a:prstGeom prst="rect">
+            <a:avLst/>
+          </a:prstGeom>
+          <a:noFill/>
+          <a:ln w="76200">
+            <a:solidFill>
+              <a:schemeClr val="tx1"/>
+            </a:solidFill>
+          </a:ln>
+        </p:spPr>
+        <p:style>
+          <a:lnRef idx="2">
+            <a:schemeClr val="accent1">
+              <a:shade val="50000"/>
+            </a:schemeClr>
+          </a:lnRef>
+          <a:fillRef idx="1">
+            <a:schemeClr val="accent1"/>
+          </a:fillRef>
+          <a:effectRef idx="0">
+            <a:schemeClr val="accent1"/>
+          </a:effectRef>
+          <a:fontRef idx="minor">
+            <a:schemeClr val="lt1"/>
+          </a:fontRef>
+        </p:style>
+        <p:txBody>
+          <a:bodyPr rtlCol="0" anchor="ctr"/>
+          <a:lstStyle/>
+          <a:p>
+            <a:pPr algn="ctr"/>
+            <a:endParaRPr lang="en-US"/>
+          </a:p>
+        </p:txBody>
+      </p:sp>
+      <p:sp>
+        <p:nvSpPr>
+          <p:cNvPr id="8" name="Rectangle 7"/>
+          <p:cNvSpPr/>
+          <p:nvPr/>
+        </p:nvSpPr>
+        <p:spPr>
+          <a:xfrm>
+            <a:off x="1745673" y="5150051"/>
+            <a:ext cx="1379912" cy="1197033"/>
+          </a:xfrm>
+          <a:prstGeom prst="rect">
+            <a:avLst/>
+          </a:prstGeom>
+          <a:noFill/>
+          <a:ln w="76200">
+            <a:solidFill>
+              <a:schemeClr val="tx1"/>
+            </a:solidFill>
+          </a:ln>
+        </p:spPr>
+        <p:style>
+          <a:lnRef idx="2">
+            <a:schemeClr val="accent1">
+              <a:shade val="50000"/>
+            </a:schemeClr>
+          </a:lnRef>
+          <a:fillRef idx="1">
+            <a:schemeClr val="accent1"/>
+          </a:fillRef>
+          <a:effectRef idx="0">
+            <a:schemeClr val="accent1"/>
+          </a:effectRef>
+          <a:fontRef idx="minor">
+            <a:schemeClr val="lt1"/>
+          </a:fontRef>
+        </p:style>
+        <p:txBody>
+          <a:bodyPr rtlCol="0" anchor="ctr"/>
+          <a:lstStyle/>
+          <a:p>
+            <a:pPr algn="ctr"/>
+            <a:endParaRPr lang="en-US"/>
+          </a:p>
+        </p:txBody>
+      </p:sp>
+      <p:sp>
+        <p:nvSpPr>
+          <p:cNvPr id="9" name="Rectangle 8"/>
+          <p:cNvSpPr/>
+          <p:nvPr/>
+        </p:nvSpPr>
+        <p:spPr>
+          <a:xfrm>
+            <a:off x="7650481" y="1346661"/>
+            <a:ext cx="1379912" cy="1197033"/>
+          </a:xfrm>
+          <a:prstGeom prst="rect">
+            <a:avLst/>
+          </a:prstGeom>
+          <a:noFill/>
+          <a:ln w="76200">
+            <a:solidFill>
+              <a:schemeClr val="tx1"/>
+            </a:solidFill>
+          </a:ln>
+        </p:spPr>
+        <p:style>
+          <a:lnRef idx="2">
+            <a:schemeClr val="accent1">
+              <a:shade val="50000"/>
+            </a:schemeClr>
+          </a:lnRef>
+          <a:fillRef idx="1">
+            <a:schemeClr val="accent1"/>
+          </a:fillRef>
+          <a:effectRef idx="0">
+            <a:schemeClr val="accent1"/>
+          </a:effectRef>
+          <a:fontRef idx="minor">
+            <a:schemeClr val="lt1"/>
+          </a:fontRef>
+        </p:style>
+        <p:txBody>
+          <a:bodyPr rtlCol="0" anchor="ctr"/>
+          <a:lstStyle/>
+          <a:p>
+            <a:pPr algn="ctr"/>
+            <a:endParaRPr lang="en-US"/>
+          </a:p>
+        </p:txBody>
+      </p:sp>
+      <p:sp>
+        <p:nvSpPr>
+          <p:cNvPr id="10" name="Rectangle 9"/>
+          <p:cNvSpPr/>
+          <p:nvPr/>
+        </p:nvSpPr>
+        <p:spPr>
+          <a:xfrm>
+            <a:off x="8025939" y="2856121"/>
+            <a:ext cx="628996" cy="901232"/>
+          </a:xfrm>
+          <a:prstGeom prst="rect">
+            <a:avLst/>
+          </a:prstGeom>
+          <a:noFill/>
+          <a:ln w="76200">
+            <a:solidFill>
+              <a:schemeClr val="tx1"/>
+            </a:solidFill>
+          </a:ln>
+        </p:spPr>
+        <p:style>
+          <a:lnRef idx="2">
+            <a:schemeClr val="accent1">
+              <a:shade val="50000"/>
+            </a:schemeClr>
+          </a:lnRef>
+          <a:fillRef idx="1">
+            <a:schemeClr val="accent1"/>
+          </a:fillRef>
+          <a:effectRef idx="0">
+            <a:schemeClr val="accent1"/>
+          </a:effectRef>
+          <a:fontRef idx="minor">
+            <a:schemeClr val="lt1"/>
+          </a:fontRef>
+        </p:style>
+        <p:txBody>
+          <a:bodyPr rtlCol="0" anchor="ctr"/>
+          <a:lstStyle/>
+          <a:p>
+            <a:pPr algn="ctr"/>
+            <a:endParaRPr lang="en-US"/>
+          </a:p>
+        </p:txBody>
+      </p:sp>
+      <p:sp>
+        <p:nvSpPr>
+          <p:cNvPr id="11" name="Rectangle 10"/>
+          <p:cNvSpPr/>
+          <p:nvPr/>
+        </p:nvSpPr>
+        <p:spPr>
+          <a:xfrm>
+            <a:off x="8025939" y="4169149"/>
+            <a:ext cx="628996" cy="569106"/>
+          </a:xfrm>
+          <a:prstGeom prst="rect">
+            <a:avLst/>
+          </a:prstGeom>
+          <a:noFill/>
+          <a:ln w="76200">
+            <a:solidFill>
+              <a:schemeClr val="tx1"/>
+            </a:solidFill>
+          </a:ln>
+        </p:spPr>
+        <p:style>
+          <a:lnRef idx="2">
+            <a:schemeClr val="accent1">
+              <a:shade val="50000"/>
+            </a:schemeClr>
+          </a:lnRef>
+          <a:fillRef idx="1">
+            <a:schemeClr val="accent1"/>
+          </a:fillRef>
+          <a:effectRef idx="0">
+            <a:schemeClr val="accent1"/>
+          </a:effectRef>
+          <a:fontRef idx="minor">
+            <a:schemeClr val="lt1"/>
+          </a:fontRef>
+        </p:style>
+        <p:txBody>
+          <a:bodyPr rtlCol="0" anchor="ctr"/>
+          <a:lstStyle/>
+          <a:p>
+            <a:pPr algn="ctr"/>
+            <a:endParaRPr lang="en-US"/>
+          </a:p>
+        </p:txBody>
+      </p:sp>
+      <p:sp>
+        <p:nvSpPr>
+          <p:cNvPr id="12" name="Rectangle 11"/>
+          <p:cNvSpPr/>
+          <p:nvPr/>
+        </p:nvSpPr>
+        <p:spPr>
+          <a:xfrm>
+            <a:off x="7650481" y="5150051"/>
+            <a:ext cx="1379912" cy="1197033"/>
+          </a:xfrm>
+          <a:prstGeom prst="rect">
+            <a:avLst/>
+          </a:prstGeom>
+          <a:noFill/>
+          <a:ln w="76200">
+            <a:solidFill>
+              <a:schemeClr val="tx1"/>
+            </a:solidFill>
+          </a:ln>
+        </p:spPr>
+        <p:style>
+          <a:lnRef idx="2">
+            <a:schemeClr val="accent1">
+              <a:shade val="50000"/>
+            </a:schemeClr>
+          </a:lnRef>
+          <a:fillRef idx="1">
+            <a:schemeClr val="accent1"/>
+          </a:fillRef>
+          <a:effectRef idx="0">
+            <a:schemeClr val="accent1"/>
+          </a:effectRef>
+          <a:fontRef idx="minor">
+            <a:schemeClr val="lt1"/>
+          </a:fontRef>
+        </p:style>
+        <p:txBody>
+          <a:bodyPr rtlCol="0" anchor="ctr"/>
+          <a:lstStyle/>
+          <a:p>
+            <a:pPr algn="ctr"/>
+            <a:endParaRPr lang="en-US"/>
+          </a:p>
+        </p:txBody>
+      </p:sp>
     </p:spTree>
     <p:extLst>
       <p:ext uri="{BB962C8B-B14F-4D97-AF65-F5344CB8AC3E}">

</xml_diff>